<commit_message>
split into VM and V
</commit_message>
<xml_diff>
--- a/documents/CS3249 Assn3 template.pptx
+++ b/documents/CS3249 Assn3 template.pptx
@@ -218,7 +218,7 @@
           <a:p>
             <a:fld id="{1A8AC75A-AAB6-4CD8-8D26-5EC8D85DBF5E}" type="datetimeFigureOut">
               <a:rPr lang="en-US" smtClean="0"/>
-              <a:t>04-Mar-20</a:t>
+              <a:t>3/6/2020</a:t>
             </a:fld>
             <a:endParaRPr lang="en-US"/>
           </a:p>
@@ -748,7 +748,7 @@
           <a:p>
             <a:fld id="{4735B788-E34D-44FB-BAA8-2AD1071C80B8}" type="datetime1">
               <a:rPr lang="en-US" smtClean="0"/>
-              <a:t>04-Mar-20</a:t>
+              <a:t>3/6/2020</a:t>
             </a:fld>
             <a:endParaRPr lang="en-US"/>
           </a:p>
@@ -912,7 +912,7 @@
           <a:p>
             <a:fld id="{85E1FD0B-8294-4722-9A81-BEB018633D0B}" type="datetime1">
               <a:rPr lang="en-US" smtClean="0"/>
-              <a:t>04-Mar-20</a:t>
+              <a:t>3/6/2020</a:t>
             </a:fld>
             <a:endParaRPr lang="en-US"/>
           </a:p>
@@ -1086,7 +1086,7 @@
           <a:p>
             <a:fld id="{51B24F80-D622-4BF6-A698-573FEA2A754F}" type="datetime1">
               <a:rPr lang="en-US" smtClean="0"/>
-              <a:t>04-Mar-20</a:t>
+              <a:t>3/6/2020</a:t>
             </a:fld>
             <a:endParaRPr lang="en-US"/>
           </a:p>
@@ -3151,7 +3151,7 @@
           <a:p>
             <a:fld id="{98285886-0922-401E-A99A-08A89DEFCEDF}" type="datetime1">
               <a:rPr lang="en-US" smtClean="0"/>
-              <a:t>04-Mar-20</a:t>
+              <a:t>3/6/2020</a:t>
             </a:fld>
             <a:endParaRPr lang="en-US" dirty="0"/>
           </a:p>
@@ -5647,7 +5647,7 @@
           <a:p>
             <a:fld id="{07FC4F73-C53A-489B-9612-F37E14790972}" type="datetime1">
               <a:rPr lang="en-US" smtClean="0"/>
-              <a:t>04-Mar-20</a:t>
+              <a:t>3/6/2020</a:t>
             </a:fld>
             <a:endParaRPr lang="en-US"/>
           </a:p>
@@ -5928,7 +5928,7 @@
           <a:p>
             <a:fld id="{BE9CE57B-98E0-4441-9FAC-9127F83404BC}" type="datetime1">
               <a:rPr lang="en-US" smtClean="0"/>
-              <a:t>04-Mar-20</a:t>
+              <a:t>3/6/2020</a:t>
             </a:fld>
             <a:endParaRPr lang="en-US"/>
           </a:p>
@@ -6343,7 +6343,7 @@
           <a:p>
             <a:fld id="{59378552-7516-48FF-A89A-97E434384B99}" type="datetime1">
               <a:rPr lang="en-US" smtClean="0"/>
-              <a:t>04-Mar-20</a:t>
+              <a:t>3/6/2020</a:t>
             </a:fld>
             <a:endParaRPr lang="en-US"/>
           </a:p>
@@ -6456,7 +6456,7 @@
           <a:p>
             <a:fld id="{058ED88B-27F8-47A1-81CA-8521C07AECC9}" type="datetime1">
               <a:rPr lang="en-US" smtClean="0"/>
-              <a:t>04-Mar-20</a:t>
+              <a:t>3/6/2020</a:t>
             </a:fld>
             <a:endParaRPr lang="en-US"/>
           </a:p>
@@ -6547,7 +6547,7 @@
           <a:p>
             <a:fld id="{7409910D-E1EE-4055-9C1A-B4F68E31828E}" type="datetime1">
               <a:rPr lang="en-US" smtClean="0"/>
-              <a:t>04-Mar-20</a:t>
+              <a:t>3/6/2020</a:t>
             </a:fld>
             <a:endParaRPr lang="en-US"/>
           </a:p>
@@ -6818,7 +6818,7 @@
           <a:p>
             <a:fld id="{CBCF2065-6584-4ACB-A4D3-00D381DA217E}" type="datetime1">
               <a:rPr lang="en-US" smtClean="0"/>
-              <a:t>04-Mar-20</a:t>
+              <a:t>3/6/2020</a:t>
             </a:fld>
             <a:endParaRPr lang="en-US"/>
           </a:p>
@@ -7066,7 +7066,7 @@
           <a:p>
             <a:fld id="{7EA7474A-CC5D-4BB1-9288-F59B2D2AC173}" type="datetime1">
               <a:rPr lang="en-US" smtClean="0"/>
-              <a:t>04-Mar-20</a:t>
+              <a:t>3/6/2020</a:t>
             </a:fld>
             <a:endParaRPr lang="en-US"/>
           </a:p>
@@ -7273,7 +7273,7 @@
           <a:p>
             <a:fld id="{CD1CBDDF-AC4F-4318-9B4D-9B44F48781D1}" type="datetime1">
               <a:rPr lang="en-US" smtClean="0"/>
-              <a:t>04-Mar-20</a:t>
+              <a:t>3/6/2020</a:t>
             </a:fld>
             <a:endParaRPr lang="en-US"/>
           </a:p>
@@ -8598,7 +8598,7 @@
           <p:cNvPr id="8" name="Title 3">
             <a:extLst>
               <a:ext uri="{FF2B5EF4-FFF2-40B4-BE49-F238E27FC236}">
-                <a16:creationId xmlns:a16="http://schemas.microsoft.com/office/drawing/2014/main" xmlns="" id="{9C796EE2-45EE-449C-9BFB-FB76B3D2D390}"/>
+                <a16:creationId xmlns:a16="http://schemas.microsoft.com/office/drawing/2014/main" id="{9C796EE2-45EE-449C-9BFB-FB76B3D2D390}"/>
               </a:ext>
             </a:extLst>
           </p:cNvPr>
@@ -8645,7 +8645,7 @@
           <p:cNvPr id="2" name="Subtitle 1">
             <a:extLst>
               <a:ext uri="{FF2B5EF4-FFF2-40B4-BE49-F238E27FC236}">
-                <a16:creationId xmlns:a16="http://schemas.microsoft.com/office/drawing/2014/main" xmlns="" id="{7371238F-051B-43BD-BDBA-E9BEE7ADEEEF}"/>
+                <a16:creationId xmlns:a16="http://schemas.microsoft.com/office/drawing/2014/main" id="{7371238F-051B-43BD-BDBA-E9BEE7ADEEEF}"/>
               </a:ext>
             </a:extLst>
           </p:cNvPr>
@@ -8712,7 +8712,7 @@
           <p:cNvPr id="6" name="Slide Number Placeholder 5">
             <a:extLst>
               <a:ext uri="{FF2B5EF4-FFF2-40B4-BE49-F238E27FC236}">
-                <a16:creationId xmlns:a16="http://schemas.microsoft.com/office/drawing/2014/main" xmlns="" id="{55846810-B79F-43AE-801A-A230A6025AA5}"/>
+                <a16:creationId xmlns:a16="http://schemas.microsoft.com/office/drawing/2014/main" id="{55846810-B79F-43AE-801A-A230A6025AA5}"/>
               </a:ext>
             </a:extLst>
           </p:cNvPr>
@@ -8742,7 +8742,7 @@
           <p:cNvPr id="5" name="Rectangle 4">
             <a:extLst>
               <a:ext uri="{FF2B5EF4-FFF2-40B4-BE49-F238E27FC236}">
-                <a16:creationId xmlns:a16="http://schemas.microsoft.com/office/drawing/2014/main" xmlns="" id="{C195146A-D301-4F6C-B78C-359C985061B9}"/>
+                <a16:creationId xmlns:a16="http://schemas.microsoft.com/office/drawing/2014/main" id="{C195146A-D301-4F6C-B78C-359C985061B9}"/>
               </a:ext>
             </a:extLst>
           </p:cNvPr>
@@ -8840,7 +8840,7 @@
           <p:cNvPr id="2" name="Title 1">
             <a:extLst>
               <a:ext uri="{FF2B5EF4-FFF2-40B4-BE49-F238E27FC236}">
-                <a16:creationId xmlns:a16="http://schemas.microsoft.com/office/drawing/2014/main" xmlns="" id="{E3A1FC88-562A-40A9-9492-C8B124C91B8D}"/>
+                <a16:creationId xmlns:a16="http://schemas.microsoft.com/office/drawing/2014/main" id="{E3A1FC88-562A-40A9-9492-C8B124C91B8D}"/>
               </a:ext>
             </a:extLst>
           </p:cNvPr>
@@ -8870,7 +8870,7 @@
           <p:cNvPr id="3" name="Content Placeholder 2">
             <a:extLst>
               <a:ext uri="{FF2B5EF4-FFF2-40B4-BE49-F238E27FC236}">
-                <a16:creationId xmlns:a16="http://schemas.microsoft.com/office/drawing/2014/main" xmlns="" id="{122162FB-3496-4AFE-88C6-BC2E4F51E496}"/>
+                <a16:creationId xmlns:a16="http://schemas.microsoft.com/office/drawing/2014/main" id="{122162FB-3496-4AFE-88C6-BC2E4F51E496}"/>
               </a:ext>
             </a:extLst>
           </p:cNvPr>
@@ -8939,7 +8939,7 @@
           <p:cNvPr id="4" name="Slide Number Placeholder 3">
             <a:extLst>
               <a:ext uri="{FF2B5EF4-FFF2-40B4-BE49-F238E27FC236}">
-                <a16:creationId xmlns:a16="http://schemas.microsoft.com/office/drawing/2014/main" xmlns="" id="{29705F2A-AC0C-47BB-9F04-A4A23C64DEF3}"/>
+                <a16:creationId xmlns:a16="http://schemas.microsoft.com/office/drawing/2014/main" id="{29705F2A-AC0C-47BB-9F04-A4A23C64DEF3}"/>
               </a:ext>
             </a:extLst>
           </p:cNvPr>
@@ -8969,7 +8969,7 @@
           <p:cNvPr id="5" name="Rectangle 4">
             <a:extLst>
               <a:ext uri="{FF2B5EF4-FFF2-40B4-BE49-F238E27FC236}">
-                <a16:creationId xmlns:a16="http://schemas.microsoft.com/office/drawing/2014/main" xmlns="" id="{29016D4E-97E3-4D07-A902-C6BA10E915C7}"/>
+                <a16:creationId xmlns:a16="http://schemas.microsoft.com/office/drawing/2014/main" id="{29016D4E-97E3-4D07-A902-C6BA10E915C7}"/>
               </a:ext>
             </a:extLst>
           </p:cNvPr>
@@ -9053,7 +9053,7 @@
           <p:cNvPr id="24" name="Picture 23">
             <a:extLst>
               <a:ext uri="{FF2B5EF4-FFF2-40B4-BE49-F238E27FC236}">
-                <a16:creationId xmlns:a16="http://schemas.microsoft.com/office/drawing/2014/main" xmlns="" id="{52F06EA9-F250-4304-8C0A-191AF6B41CB5}"/>
+                <a16:creationId xmlns:a16="http://schemas.microsoft.com/office/drawing/2014/main" id="{52F06EA9-F250-4304-8C0A-191AF6B41CB5}"/>
               </a:ext>
             </a:extLst>
           </p:cNvPr>
@@ -9082,7 +9082,7 @@
           <p:cNvPr id="2" name="Title 1">
             <a:extLst>
               <a:ext uri="{FF2B5EF4-FFF2-40B4-BE49-F238E27FC236}">
-                <a16:creationId xmlns:a16="http://schemas.microsoft.com/office/drawing/2014/main" xmlns="" id="{A418199B-A618-4B2F-AE3A-84D4A631B665}"/>
+                <a16:creationId xmlns:a16="http://schemas.microsoft.com/office/drawing/2014/main" id="{A418199B-A618-4B2F-AE3A-84D4A631B665}"/>
               </a:ext>
             </a:extLst>
           </p:cNvPr>
@@ -9111,7 +9111,7 @@
           <p:cNvPr id="4" name="Slide Number Placeholder 3">
             <a:extLst>
               <a:ext uri="{FF2B5EF4-FFF2-40B4-BE49-F238E27FC236}">
-                <a16:creationId xmlns:a16="http://schemas.microsoft.com/office/drawing/2014/main" xmlns="" id="{2564E604-843C-4952-AC58-724EE6937FFC}"/>
+                <a16:creationId xmlns:a16="http://schemas.microsoft.com/office/drawing/2014/main" id="{2564E604-843C-4952-AC58-724EE6937FFC}"/>
               </a:ext>
             </a:extLst>
           </p:cNvPr>
@@ -9141,7 +9141,7 @@
           <p:cNvPr id="7" name="Oval 6">
             <a:extLst>
               <a:ext uri="{FF2B5EF4-FFF2-40B4-BE49-F238E27FC236}">
-                <a16:creationId xmlns:a16="http://schemas.microsoft.com/office/drawing/2014/main" xmlns="" id="{80BD9522-D467-45FD-A26C-A2A306D53A0D}"/>
+                <a16:creationId xmlns:a16="http://schemas.microsoft.com/office/drawing/2014/main" id="{80BD9522-D467-45FD-A26C-A2A306D53A0D}"/>
               </a:ext>
             </a:extLst>
           </p:cNvPr>
@@ -9193,7 +9193,7 @@
           <p:cNvPr id="12" name="Rectangle 11">
             <a:extLst>
               <a:ext uri="{FF2B5EF4-FFF2-40B4-BE49-F238E27FC236}">
-                <a16:creationId xmlns:a16="http://schemas.microsoft.com/office/drawing/2014/main" xmlns="" id="{7ABA9356-23B3-4122-B4EF-19D72516C898}"/>
+                <a16:creationId xmlns:a16="http://schemas.microsoft.com/office/drawing/2014/main" id="{7ABA9356-23B3-4122-B4EF-19D72516C898}"/>
               </a:ext>
             </a:extLst>
           </p:cNvPr>
@@ -9246,7 +9246,7 @@
           <p:cNvPr id="27" name="Connector: Elbow 26">
             <a:extLst>
               <a:ext uri="{FF2B5EF4-FFF2-40B4-BE49-F238E27FC236}">
-                <a16:creationId xmlns:a16="http://schemas.microsoft.com/office/drawing/2014/main" xmlns="" id="{AD96D0BD-EF06-4425-9FB0-0991354D62CF}"/>
+                <a16:creationId xmlns:a16="http://schemas.microsoft.com/office/drawing/2014/main" id="{AD96D0BD-EF06-4425-9FB0-0991354D62CF}"/>
               </a:ext>
             </a:extLst>
           </p:cNvPr>
@@ -9295,7 +9295,7 @@
           <p:cNvPr id="8" name="Rectangle 7">
             <a:extLst>
               <a:ext uri="{FF2B5EF4-FFF2-40B4-BE49-F238E27FC236}">
-                <a16:creationId xmlns:a16="http://schemas.microsoft.com/office/drawing/2014/main" xmlns="" id="{7ABA9356-23B3-4122-B4EF-19D72516C898}"/>
+                <a16:creationId xmlns:a16="http://schemas.microsoft.com/office/drawing/2014/main" id="{7ABA9356-23B3-4122-B4EF-19D72516C898}"/>
               </a:ext>
             </a:extLst>
           </p:cNvPr>
@@ -9336,7 +9336,7 @@
           <a:p>
             <a:pPr algn="ctr"/>
             <a:r>
-              <a:rPr lang="en-SG" b="1" dirty="0" err="1" smtClean="0"/>
+              <a:rPr lang="en-SG" b="1" dirty="0" err="1"/>
               <a:t>DisplayBackground</a:t>
             </a:r>
             <a:endParaRPr lang="en-SG" b="1" dirty="0"/>
@@ -9348,7 +9348,7 @@
           <p:cNvPr id="9" name="Rectangle 8">
             <a:extLst>
               <a:ext uri="{FF2B5EF4-FFF2-40B4-BE49-F238E27FC236}">
-                <a16:creationId xmlns:a16="http://schemas.microsoft.com/office/drawing/2014/main" xmlns="" id="{7ABA9356-23B3-4122-B4EF-19D72516C898}"/>
+                <a16:creationId xmlns:a16="http://schemas.microsoft.com/office/drawing/2014/main" id="{7ABA9356-23B3-4122-B4EF-19D72516C898}"/>
               </a:ext>
             </a:extLst>
           </p:cNvPr>
@@ -9389,7 +9389,7 @@
           <a:p>
             <a:pPr algn="ctr"/>
             <a:r>
-              <a:rPr lang="en-SG" b="1" dirty="0" err="1" smtClean="0"/>
+              <a:rPr lang="en-SG" b="1" dirty="0" err="1"/>
               <a:t>CurrentTemperature</a:t>
             </a:r>
             <a:endParaRPr lang="en-SG" b="1" dirty="0"/>
@@ -9401,7 +9401,7 @@
           <p:cNvPr id="10" name="Rectangle 9">
             <a:extLst>
               <a:ext uri="{FF2B5EF4-FFF2-40B4-BE49-F238E27FC236}">
-                <a16:creationId xmlns:a16="http://schemas.microsoft.com/office/drawing/2014/main" xmlns="" id="{7ABA9356-23B3-4122-B4EF-19D72516C898}"/>
+                <a16:creationId xmlns:a16="http://schemas.microsoft.com/office/drawing/2014/main" id="{7ABA9356-23B3-4122-B4EF-19D72516C898}"/>
               </a:ext>
             </a:extLst>
           </p:cNvPr>
@@ -9442,7 +9442,7 @@
           <a:p>
             <a:pPr algn="ctr"/>
             <a:r>
-              <a:rPr lang="en-SG" b="1" dirty="0" err="1" smtClean="0"/>
+              <a:rPr lang="en-SG" b="1" dirty="0" err="1"/>
               <a:t>TargetTemperature</a:t>
             </a:r>
             <a:endParaRPr lang="en-SG" b="1" dirty="0"/>
@@ -9454,7 +9454,7 @@
           <p:cNvPr id="11" name="Rectangle 10">
             <a:extLst>
               <a:ext uri="{FF2B5EF4-FFF2-40B4-BE49-F238E27FC236}">
-                <a16:creationId xmlns:a16="http://schemas.microsoft.com/office/drawing/2014/main" xmlns="" id="{7ABA9356-23B3-4122-B4EF-19D72516C898}"/>
+                <a16:creationId xmlns:a16="http://schemas.microsoft.com/office/drawing/2014/main" id="{7ABA9356-23B3-4122-B4EF-19D72516C898}"/>
               </a:ext>
             </a:extLst>
           </p:cNvPr>
@@ -9495,7 +9495,7 @@
           <a:p>
             <a:pPr algn="ctr"/>
             <a:r>
-              <a:rPr lang="en-SG" b="1" dirty="0" err="1" smtClean="0"/>
+              <a:rPr lang="en-SG" b="1" dirty="0" err="1"/>
               <a:t>TextDisplay</a:t>
             </a:r>
             <a:endParaRPr lang="en-SG" b="1" dirty="0"/>
@@ -9507,7 +9507,7 @@
           <p:cNvPr id="13" name="Rectangle 12">
             <a:extLst>
               <a:ext uri="{FF2B5EF4-FFF2-40B4-BE49-F238E27FC236}">
-                <a16:creationId xmlns:a16="http://schemas.microsoft.com/office/drawing/2014/main" xmlns="" id="{7ABA9356-23B3-4122-B4EF-19D72516C898}"/>
+                <a16:creationId xmlns:a16="http://schemas.microsoft.com/office/drawing/2014/main" id="{7ABA9356-23B3-4122-B4EF-19D72516C898}"/>
               </a:ext>
             </a:extLst>
           </p:cNvPr>
@@ -9548,7 +9548,7 @@
           <a:p>
             <a:pPr algn="ctr"/>
             <a:r>
-              <a:rPr lang="en-SG" b="1" dirty="0" err="1" smtClean="0"/>
+              <a:rPr lang="en-SG" b="1" dirty="0" err="1"/>
               <a:t>RadialSlider</a:t>
             </a:r>
             <a:endParaRPr lang="en-SG" b="1" dirty="0"/>
@@ -9560,7 +9560,7 @@
           <p:cNvPr id="14" name="Rectangle 13">
             <a:extLst>
               <a:ext uri="{FF2B5EF4-FFF2-40B4-BE49-F238E27FC236}">
-                <a16:creationId xmlns:a16="http://schemas.microsoft.com/office/drawing/2014/main" xmlns="" id="{7ABA9356-23B3-4122-B4EF-19D72516C898}"/>
+                <a16:creationId xmlns:a16="http://schemas.microsoft.com/office/drawing/2014/main" id="{7ABA9356-23B3-4122-B4EF-19D72516C898}"/>
               </a:ext>
             </a:extLst>
           </p:cNvPr>
@@ -9601,7 +9601,7 @@
           <a:p>
             <a:pPr algn="ctr"/>
             <a:r>
-              <a:rPr lang="en-SG" b="1" dirty="0" err="1" smtClean="0"/>
+              <a:rPr lang="en-SG" b="1" dirty="0" err="1"/>
               <a:t>DisplayFace</a:t>
             </a:r>
             <a:endParaRPr lang="en-SG" b="1" dirty="0"/>
@@ -9751,7 +9751,7 @@
           <p:cNvPr id="20" name="Connector: Elbow 26">
             <a:extLst>
               <a:ext uri="{FF2B5EF4-FFF2-40B4-BE49-F238E27FC236}">
-                <a16:creationId xmlns:a16="http://schemas.microsoft.com/office/drawing/2014/main" xmlns="" id="{AD96D0BD-EF06-4425-9FB0-0991354D62CF}"/>
+                <a16:creationId xmlns:a16="http://schemas.microsoft.com/office/drawing/2014/main" id="{AD96D0BD-EF06-4425-9FB0-0991354D62CF}"/>
               </a:ext>
             </a:extLst>
           </p:cNvPr>
@@ -9800,7 +9800,7 @@
           <p:cNvPr id="21" name="Connector: Elbow 26">
             <a:extLst>
               <a:ext uri="{FF2B5EF4-FFF2-40B4-BE49-F238E27FC236}">
-                <a16:creationId xmlns:a16="http://schemas.microsoft.com/office/drawing/2014/main" xmlns="" id="{AD96D0BD-EF06-4425-9FB0-0991354D62CF}"/>
+                <a16:creationId xmlns:a16="http://schemas.microsoft.com/office/drawing/2014/main" id="{AD96D0BD-EF06-4425-9FB0-0991354D62CF}"/>
               </a:ext>
             </a:extLst>
           </p:cNvPr>
@@ -9849,7 +9849,7 @@
           <p:cNvPr id="22" name="Connector: Elbow 26">
             <a:extLst>
               <a:ext uri="{FF2B5EF4-FFF2-40B4-BE49-F238E27FC236}">
-                <a16:creationId xmlns:a16="http://schemas.microsoft.com/office/drawing/2014/main" xmlns="" id="{AD96D0BD-EF06-4425-9FB0-0991354D62CF}"/>
+                <a16:creationId xmlns:a16="http://schemas.microsoft.com/office/drawing/2014/main" id="{AD96D0BD-EF06-4425-9FB0-0991354D62CF}"/>
               </a:ext>
             </a:extLst>
           </p:cNvPr>
@@ -9898,7 +9898,7 @@
           <p:cNvPr id="23" name="Connector: Elbow 26">
             <a:extLst>
               <a:ext uri="{FF2B5EF4-FFF2-40B4-BE49-F238E27FC236}">
-                <a16:creationId xmlns:a16="http://schemas.microsoft.com/office/drawing/2014/main" xmlns="" id="{AD96D0BD-EF06-4425-9FB0-0991354D62CF}"/>
+                <a16:creationId xmlns:a16="http://schemas.microsoft.com/office/drawing/2014/main" id="{AD96D0BD-EF06-4425-9FB0-0991354D62CF}"/>
               </a:ext>
             </a:extLst>
           </p:cNvPr>
@@ -9947,7 +9947,7 @@
           <p:cNvPr id="25" name="Connector: Elbow 26">
             <a:extLst>
               <a:ext uri="{FF2B5EF4-FFF2-40B4-BE49-F238E27FC236}">
-                <a16:creationId xmlns:a16="http://schemas.microsoft.com/office/drawing/2014/main" xmlns="" id="{AD96D0BD-EF06-4425-9FB0-0991354D62CF}"/>
+                <a16:creationId xmlns:a16="http://schemas.microsoft.com/office/drawing/2014/main" id="{AD96D0BD-EF06-4425-9FB0-0991354D62CF}"/>
               </a:ext>
             </a:extLst>
           </p:cNvPr>
@@ -10586,7 +10586,7 @@
           <p:cNvPr id="2" name="Title 1">
             <a:extLst>
               <a:ext uri="{FF2B5EF4-FFF2-40B4-BE49-F238E27FC236}">
-                <a16:creationId xmlns:a16="http://schemas.microsoft.com/office/drawing/2014/main" xmlns="" id="{E276E36C-C80B-4E82-BBA5-1941988AECC3}"/>
+                <a16:creationId xmlns:a16="http://schemas.microsoft.com/office/drawing/2014/main" id="{E276E36C-C80B-4E82-BBA5-1941988AECC3}"/>
               </a:ext>
             </a:extLst>
           </p:cNvPr>
@@ -10607,13 +10607,8 @@
             <a:pPr algn="l"/>
             <a:r>
               <a:rPr lang="en-US" dirty="0"/>
-              <a:t>Class </a:t>
-            </a:r>
-            <a:r>
-              <a:rPr lang="en-US" dirty="0" smtClean="0"/>
-              <a:t>Diagrams</a:t>
-            </a:r>
-            <a:endParaRPr lang="en-US" dirty="0"/>
+              <a:t>Class Diagrams</a:t>
+            </a:r>
           </a:p>
         </p:txBody>
       </p:sp>
@@ -10622,7 +10617,7 @@
           <p:cNvPr id="4" name="Slide Number Placeholder 3">
             <a:extLst>
               <a:ext uri="{FF2B5EF4-FFF2-40B4-BE49-F238E27FC236}">
-                <a16:creationId xmlns:a16="http://schemas.microsoft.com/office/drawing/2014/main" xmlns="" id="{A446D1E8-CB91-49EC-BF45-D12A124C4FF7}"/>
+                <a16:creationId xmlns:a16="http://schemas.microsoft.com/office/drawing/2014/main" id="{A446D1E8-CB91-49EC-BF45-D12A124C4FF7}"/>
               </a:ext>
             </a:extLst>
           </p:cNvPr>
@@ -10649,7 +10644,13 @@
       </p:sp>
       <p:pic>
         <p:nvPicPr>
-          <p:cNvPr id="3" name="Content Placeholder 2"/>
+          <p:cNvPr id="8" name="Content Placeholder 7" descr="A screenshot of a cell phone&#10;&#10;Description automatically generated">
+            <a:extLst>
+              <a:ext uri="{FF2B5EF4-FFF2-40B4-BE49-F238E27FC236}">
+                <a16:creationId xmlns:a16="http://schemas.microsoft.com/office/drawing/2014/main" id="{6001DBC6-71C1-442E-8A40-D31635602E8A}"/>
+              </a:ext>
+            </a:extLst>
+          </p:cNvPr>
           <p:cNvPicPr>
             <a:picLocks noGrp="1" noChangeAspect="1"/>
           </p:cNvPicPr>
@@ -10671,8 +10672,8 @@
         </p:blipFill>
         <p:spPr>
           <a:xfrm>
-            <a:off x="5029200" y="301434"/>
-            <a:ext cx="2825697" cy="5563838"/>
+            <a:off x="4876800" y="457200"/>
+            <a:ext cx="2895600" cy="5709636"/>
           </a:xfrm>
         </p:spPr>
       </p:pic>
@@ -10723,7 +10724,7 @@
           <p:cNvPr id="2" name="Title 1">
             <a:extLst>
               <a:ext uri="{FF2B5EF4-FFF2-40B4-BE49-F238E27FC236}">
-                <a16:creationId xmlns:a16="http://schemas.microsoft.com/office/drawing/2014/main" xmlns="" id="{E276E36C-C80B-4E82-BBA5-1941988AECC3}"/>
+                <a16:creationId xmlns:a16="http://schemas.microsoft.com/office/drawing/2014/main" id="{E276E36C-C80B-4E82-BBA5-1941988AECC3}"/>
               </a:ext>
             </a:extLst>
           </p:cNvPr>
@@ -10746,10 +10747,6 @@
               <a:rPr lang="en-US" dirty="0" err="1"/>
               <a:t>Statechart</a:t>
             </a:r>
-            <a:r>
-              <a:rPr lang="en-US" dirty="0"/>
-              <a:t/>
-            </a:r>
             <a:br>
               <a:rPr lang="en-US" dirty="0"/>
             </a:br>
@@ -10772,7 +10769,7 @@
           <p:cNvPr id="4" name="Slide Number Placeholder 3">
             <a:extLst>
               <a:ext uri="{FF2B5EF4-FFF2-40B4-BE49-F238E27FC236}">
-                <a16:creationId xmlns:a16="http://schemas.microsoft.com/office/drawing/2014/main" xmlns="" id="{A446D1E8-CB91-49EC-BF45-D12A124C4FF7}"/>
+                <a16:creationId xmlns:a16="http://schemas.microsoft.com/office/drawing/2014/main" id="{A446D1E8-CB91-49EC-BF45-D12A124C4FF7}"/>
               </a:ext>
             </a:extLst>
           </p:cNvPr>
@@ -10873,7 +10870,7 @@
           <p:cNvPr id="2" name="Title 1">
             <a:extLst>
               <a:ext uri="{FF2B5EF4-FFF2-40B4-BE49-F238E27FC236}">
-                <a16:creationId xmlns:a16="http://schemas.microsoft.com/office/drawing/2014/main" xmlns="" id="{E3A1FC88-562A-40A9-9492-C8B124C91B8D}"/>
+                <a16:creationId xmlns:a16="http://schemas.microsoft.com/office/drawing/2014/main" id="{E3A1FC88-562A-40A9-9492-C8B124C91B8D}"/>
               </a:ext>
             </a:extLst>
           </p:cNvPr>
@@ -10903,7 +10900,7 @@
           <p:cNvPr id="3" name="Content Placeholder 2">
             <a:extLst>
               <a:ext uri="{FF2B5EF4-FFF2-40B4-BE49-F238E27FC236}">
-                <a16:creationId xmlns:a16="http://schemas.microsoft.com/office/drawing/2014/main" xmlns="" id="{122162FB-3496-4AFE-88C6-BC2E4F51E496}"/>
+                <a16:creationId xmlns:a16="http://schemas.microsoft.com/office/drawing/2014/main" id="{122162FB-3496-4AFE-88C6-BC2E4F51E496}"/>
               </a:ext>
             </a:extLst>
           </p:cNvPr>
@@ -10930,7 +10927,7 @@
           <p:cNvPr id="4" name="Slide Number Placeholder 3">
             <a:extLst>
               <a:ext uri="{FF2B5EF4-FFF2-40B4-BE49-F238E27FC236}">
-                <a16:creationId xmlns:a16="http://schemas.microsoft.com/office/drawing/2014/main" xmlns="" id="{29705F2A-AC0C-47BB-9F04-A4A23C64DEF3}"/>
+                <a16:creationId xmlns:a16="http://schemas.microsoft.com/office/drawing/2014/main" id="{29705F2A-AC0C-47BB-9F04-A4A23C64DEF3}"/>
               </a:ext>
             </a:extLst>
           </p:cNvPr>
@@ -11002,7 +10999,7 @@
           <p:cNvPr id="2" name="Title 1">
             <a:extLst>
               <a:ext uri="{FF2B5EF4-FFF2-40B4-BE49-F238E27FC236}">
-                <a16:creationId xmlns:a16="http://schemas.microsoft.com/office/drawing/2014/main" xmlns="" id="{AADACEA6-C6E3-4DF4-9C77-44F52BB7AA1A}"/>
+                <a16:creationId xmlns:a16="http://schemas.microsoft.com/office/drawing/2014/main" id="{AADACEA6-C6E3-4DF4-9C77-44F52BB7AA1A}"/>
               </a:ext>
             </a:extLst>
           </p:cNvPr>
@@ -11036,7 +11033,7 @@
           <p:cNvPr id="3" name="Content Placeholder 2">
             <a:extLst>
               <a:ext uri="{FF2B5EF4-FFF2-40B4-BE49-F238E27FC236}">
-                <a16:creationId xmlns:a16="http://schemas.microsoft.com/office/drawing/2014/main" xmlns="" id="{08B0B89C-6A31-43E3-BAD2-BC0EE2E2144F}"/>
+                <a16:creationId xmlns:a16="http://schemas.microsoft.com/office/drawing/2014/main" id="{08B0B89C-6A31-43E3-BAD2-BC0EE2E2144F}"/>
               </a:ext>
             </a:extLst>
           </p:cNvPr>
@@ -11068,7 +11065,7 @@
           <p:cNvPr id="4" name="Slide Number Placeholder 3">
             <a:extLst>
               <a:ext uri="{FF2B5EF4-FFF2-40B4-BE49-F238E27FC236}">
-                <a16:creationId xmlns:a16="http://schemas.microsoft.com/office/drawing/2014/main" xmlns="" id="{55F0F331-779C-4EC7-BF29-7392DA7C9A80}"/>
+                <a16:creationId xmlns:a16="http://schemas.microsoft.com/office/drawing/2014/main" id="{55F0F331-779C-4EC7-BF29-7392DA7C9A80}"/>
               </a:ext>
             </a:extLst>
           </p:cNvPr>
@@ -11140,7 +11137,7 @@
           <p:cNvPr id="2" name="Title 1">
             <a:extLst>
               <a:ext uri="{FF2B5EF4-FFF2-40B4-BE49-F238E27FC236}">
-                <a16:creationId xmlns:a16="http://schemas.microsoft.com/office/drawing/2014/main" xmlns="" id="{E3A1FC88-562A-40A9-9492-C8B124C91B8D}"/>
+                <a16:creationId xmlns:a16="http://schemas.microsoft.com/office/drawing/2014/main" id="{E3A1FC88-562A-40A9-9492-C8B124C91B8D}"/>
               </a:ext>
             </a:extLst>
           </p:cNvPr>
@@ -11178,7 +11175,7 @@
           <p:cNvPr id="3" name="Content Placeholder 2">
             <a:extLst>
               <a:ext uri="{FF2B5EF4-FFF2-40B4-BE49-F238E27FC236}">
-                <a16:creationId xmlns:a16="http://schemas.microsoft.com/office/drawing/2014/main" xmlns="" id="{122162FB-3496-4AFE-88C6-BC2E4F51E496}"/>
+                <a16:creationId xmlns:a16="http://schemas.microsoft.com/office/drawing/2014/main" id="{122162FB-3496-4AFE-88C6-BC2E4F51E496}"/>
               </a:ext>
             </a:extLst>
           </p:cNvPr>
@@ -11205,7 +11202,7 @@
           <p:cNvPr id="4" name="Slide Number Placeholder 3">
             <a:extLst>
               <a:ext uri="{FF2B5EF4-FFF2-40B4-BE49-F238E27FC236}">
-                <a16:creationId xmlns:a16="http://schemas.microsoft.com/office/drawing/2014/main" xmlns="" id="{29705F2A-AC0C-47BB-9F04-A4A23C64DEF3}"/>
+                <a16:creationId xmlns:a16="http://schemas.microsoft.com/office/drawing/2014/main" id="{29705F2A-AC0C-47BB-9F04-A4A23C64DEF3}"/>
               </a:ext>
             </a:extLst>
           </p:cNvPr>
@@ -11277,7 +11274,7 @@
           <p:cNvPr id="2" name="Title 1">
             <a:extLst>
               <a:ext uri="{FF2B5EF4-FFF2-40B4-BE49-F238E27FC236}">
-                <a16:creationId xmlns:a16="http://schemas.microsoft.com/office/drawing/2014/main" xmlns="" id="{E3A1FC88-562A-40A9-9492-C8B124C91B8D}"/>
+                <a16:creationId xmlns:a16="http://schemas.microsoft.com/office/drawing/2014/main" id="{E3A1FC88-562A-40A9-9492-C8B124C91B8D}"/>
               </a:ext>
             </a:extLst>
           </p:cNvPr>
@@ -11314,7 +11311,7 @@
           <p:cNvPr id="3" name="Content Placeholder 2">
             <a:extLst>
               <a:ext uri="{FF2B5EF4-FFF2-40B4-BE49-F238E27FC236}">
-                <a16:creationId xmlns:a16="http://schemas.microsoft.com/office/drawing/2014/main" xmlns="" id="{122162FB-3496-4AFE-88C6-BC2E4F51E496}"/>
+                <a16:creationId xmlns:a16="http://schemas.microsoft.com/office/drawing/2014/main" id="{122162FB-3496-4AFE-88C6-BC2E4F51E496}"/>
               </a:ext>
             </a:extLst>
           </p:cNvPr>
@@ -11341,7 +11338,7 @@
           <p:cNvPr id="4" name="Slide Number Placeholder 3">
             <a:extLst>
               <a:ext uri="{FF2B5EF4-FFF2-40B4-BE49-F238E27FC236}">
-                <a16:creationId xmlns:a16="http://schemas.microsoft.com/office/drawing/2014/main" xmlns="" id="{29705F2A-AC0C-47BB-9F04-A4A23C64DEF3}"/>
+                <a16:creationId xmlns:a16="http://schemas.microsoft.com/office/drawing/2014/main" id="{29705F2A-AC0C-47BB-9F04-A4A23C64DEF3}"/>
               </a:ext>
             </a:extLst>
           </p:cNvPr>
@@ -11413,7 +11410,7 @@
           <p:cNvPr id="2" name="Title 1">
             <a:extLst>
               <a:ext uri="{FF2B5EF4-FFF2-40B4-BE49-F238E27FC236}">
-                <a16:creationId xmlns:a16="http://schemas.microsoft.com/office/drawing/2014/main" xmlns="" id="{E3A1FC88-562A-40A9-9492-C8B124C91B8D}"/>
+                <a16:creationId xmlns:a16="http://schemas.microsoft.com/office/drawing/2014/main" id="{E3A1FC88-562A-40A9-9492-C8B124C91B8D}"/>
               </a:ext>
             </a:extLst>
           </p:cNvPr>
@@ -11450,7 +11447,7 @@
           <p:cNvPr id="3" name="Content Placeholder 2">
             <a:extLst>
               <a:ext uri="{FF2B5EF4-FFF2-40B4-BE49-F238E27FC236}">
-                <a16:creationId xmlns:a16="http://schemas.microsoft.com/office/drawing/2014/main" xmlns="" id="{122162FB-3496-4AFE-88C6-BC2E4F51E496}"/>
+                <a16:creationId xmlns:a16="http://schemas.microsoft.com/office/drawing/2014/main" id="{122162FB-3496-4AFE-88C6-BC2E4F51E496}"/>
               </a:ext>
             </a:extLst>
           </p:cNvPr>
@@ -11477,7 +11474,7 @@
           <p:cNvPr id="4" name="Slide Number Placeholder 3">
             <a:extLst>
               <a:ext uri="{FF2B5EF4-FFF2-40B4-BE49-F238E27FC236}">
-                <a16:creationId xmlns:a16="http://schemas.microsoft.com/office/drawing/2014/main" xmlns="" id="{29705F2A-AC0C-47BB-9F04-A4A23C64DEF3}"/>
+                <a16:creationId xmlns:a16="http://schemas.microsoft.com/office/drawing/2014/main" id="{29705F2A-AC0C-47BB-9F04-A4A23C64DEF3}"/>
               </a:ext>
             </a:extLst>
           </p:cNvPr>

</xml_diff>

<commit_message>
added scroll function and completed documentation
</commit_message>
<xml_diff>
--- a/documents/CS3249 Assn3 template.pptx
+++ b/documents/CS3249 Assn3 template.pptx
@@ -218,7 +218,7 @@
           <a:p>
             <a:fld id="{1A8AC75A-AAB6-4CD8-8D26-5EC8D85DBF5E}" type="datetimeFigureOut">
               <a:rPr lang="en-US" smtClean="0"/>
-              <a:t>3/6/2020</a:t>
+              <a:t>09-Mar-20</a:t>
             </a:fld>
             <a:endParaRPr lang="en-US"/>
           </a:p>
@@ -748,7 +748,7 @@
           <a:p>
             <a:fld id="{4735B788-E34D-44FB-BAA8-2AD1071C80B8}" type="datetime1">
               <a:rPr lang="en-US" smtClean="0"/>
-              <a:t>3/6/2020</a:t>
+              <a:t>09-Mar-20</a:t>
             </a:fld>
             <a:endParaRPr lang="en-US"/>
           </a:p>
@@ -912,7 +912,7 @@
           <a:p>
             <a:fld id="{85E1FD0B-8294-4722-9A81-BEB018633D0B}" type="datetime1">
               <a:rPr lang="en-US" smtClean="0"/>
-              <a:t>3/6/2020</a:t>
+              <a:t>09-Mar-20</a:t>
             </a:fld>
             <a:endParaRPr lang="en-US"/>
           </a:p>
@@ -1086,7 +1086,7 @@
           <a:p>
             <a:fld id="{51B24F80-D622-4BF6-A698-573FEA2A754F}" type="datetime1">
               <a:rPr lang="en-US" smtClean="0"/>
-              <a:t>3/6/2020</a:t>
+              <a:t>09-Mar-20</a:t>
             </a:fld>
             <a:endParaRPr lang="en-US"/>
           </a:p>
@@ -3151,7 +3151,7 @@
           <a:p>
             <a:fld id="{98285886-0922-401E-A99A-08A89DEFCEDF}" type="datetime1">
               <a:rPr lang="en-US" smtClean="0"/>
-              <a:t>3/6/2020</a:t>
+              <a:t>09-Mar-20</a:t>
             </a:fld>
             <a:endParaRPr lang="en-US" dirty="0"/>
           </a:p>
@@ -5647,7 +5647,7 @@
           <a:p>
             <a:fld id="{07FC4F73-C53A-489B-9612-F37E14790972}" type="datetime1">
               <a:rPr lang="en-US" smtClean="0"/>
-              <a:t>3/6/2020</a:t>
+              <a:t>09-Mar-20</a:t>
             </a:fld>
             <a:endParaRPr lang="en-US"/>
           </a:p>
@@ -5928,7 +5928,7 @@
           <a:p>
             <a:fld id="{BE9CE57B-98E0-4441-9FAC-9127F83404BC}" type="datetime1">
               <a:rPr lang="en-US" smtClean="0"/>
-              <a:t>3/6/2020</a:t>
+              <a:t>09-Mar-20</a:t>
             </a:fld>
             <a:endParaRPr lang="en-US"/>
           </a:p>
@@ -6343,7 +6343,7 @@
           <a:p>
             <a:fld id="{59378552-7516-48FF-A89A-97E434384B99}" type="datetime1">
               <a:rPr lang="en-US" smtClean="0"/>
-              <a:t>3/6/2020</a:t>
+              <a:t>09-Mar-20</a:t>
             </a:fld>
             <a:endParaRPr lang="en-US"/>
           </a:p>
@@ -6456,7 +6456,7 @@
           <a:p>
             <a:fld id="{058ED88B-27F8-47A1-81CA-8521C07AECC9}" type="datetime1">
               <a:rPr lang="en-US" smtClean="0"/>
-              <a:t>3/6/2020</a:t>
+              <a:t>09-Mar-20</a:t>
             </a:fld>
             <a:endParaRPr lang="en-US"/>
           </a:p>
@@ -6547,7 +6547,7 @@
           <a:p>
             <a:fld id="{7409910D-E1EE-4055-9C1A-B4F68E31828E}" type="datetime1">
               <a:rPr lang="en-US" smtClean="0"/>
-              <a:t>3/6/2020</a:t>
+              <a:t>09-Mar-20</a:t>
             </a:fld>
             <a:endParaRPr lang="en-US"/>
           </a:p>
@@ -6818,7 +6818,7 @@
           <a:p>
             <a:fld id="{CBCF2065-6584-4ACB-A4D3-00D381DA217E}" type="datetime1">
               <a:rPr lang="en-US" smtClean="0"/>
-              <a:t>3/6/2020</a:t>
+              <a:t>09-Mar-20</a:t>
             </a:fld>
             <a:endParaRPr lang="en-US"/>
           </a:p>
@@ -7066,7 +7066,7 @@
           <a:p>
             <a:fld id="{7EA7474A-CC5D-4BB1-9288-F59B2D2AC173}" type="datetime1">
               <a:rPr lang="en-US" smtClean="0"/>
-              <a:t>3/6/2020</a:t>
+              <a:t>09-Mar-20</a:t>
             </a:fld>
             <a:endParaRPr lang="en-US"/>
           </a:p>
@@ -7273,7 +7273,7 @@
           <a:p>
             <a:fld id="{CD1CBDDF-AC4F-4318-9B4D-9B44F48781D1}" type="datetime1">
               <a:rPr lang="en-US" smtClean="0"/>
-              <a:t>3/6/2020</a:t>
+              <a:t>09-Mar-20</a:t>
             </a:fld>
             <a:endParaRPr lang="en-US"/>
           </a:p>
@@ -8598,7 +8598,7 @@
           <p:cNvPr id="8" name="Title 3">
             <a:extLst>
               <a:ext uri="{FF2B5EF4-FFF2-40B4-BE49-F238E27FC236}">
-                <a16:creationId xmlns:a16="http://schemas.microsoft.com/office/drawing/2014/main" id="{9C796EE2-45EE-449C-9BFB-FB76B3D2D390}"/>
+                <a16:creationId xmlns:a16="http://schemas.microsoft.com/office/drawing/2014/main" xmlns="" id="{9C796EE2-45EE-449C-9BFB-FB76B3D2D390}"/>
               </a:ext>
             </a:extLst>
           </p:cNvPr>
@@ -8645,7 +8645,7 @@
           <p:cNvPr id="2" name="Subtitle 1">
             <a:extLst>
               <a:ext uri="{FF2B5EF4-FFF2-40B4-BE49-F238E27FC236}">
-                <a16:creationId xmlns:a16="http://schemas.microsoft.com/office/drawing/2014/main" id="{7371238F-051B-43BD-BDBA-E9BEE7ADEEEF}"/>
+                <a16:creationId xmlns:a16="http://schemas.microsoft.com/office/drawing/2014/main" xmlns="" id="{7371238F-051B-43BD-BDBA-E9BEE7ADEEEF}"/>
               </a:ext>
             </a:extLst>
           </p:cNvPr>
@@ -8712,7 +8712,7 @@
           <p:cNvPr id="6" name="Slide Number Placeholder 5">
             <a:extLst>
               <a:ext uri="{FF2B5EF4-FFF2-40B4-BE49-F238E27FC236}">
-                <a16:creationId xmlns:a16="http://schemas.microsoft.com/office/drawing/2014/main" id="{55846810-B79F-43AE-801A-A230A6025AA5}"/>
+                <a16:creationId xmlns:a16="http://schemas.microsoft.com/office/drawing/2014/main" xmlns="" id="{55846810-B79F-43AE-801A-A230A6025AA5}"/>
               </a:ext>
             </a:extLst>
           </p:cNvPr>
@@ -8742,7 +8742,7 @@
           <p:cNvPr id="5" name="Rectangle 4">
             <a:extLst>
               <a:ext uri="{FF2B5EF4-FFF2-40B4-BE49-F238E27FC236}">
-                <a16:creationId xmlns:a16="http://schemas.microsoft.com/office/drawing/2014/main" id="{C195146A-D301-4F6C-B78C-359C985061B9}"/>
+                <a16:creationId xmlns:a16="http://schemas.microsoft.com/office/drawing/2014/main" xmlns="" id="{C195146A-D301-4F6C-B78C-359C985061B9}"/>
               </a:ext>
             </a:extLst>
           </p:cNvPr>
@@ -8840,7 +8840,7 @@
           <p:cNvPr id="2" name="Title 1">
             <a:extLst>
               <a:ext uri="{FF2B5EF4-FFF2-40B4-BE49-F238E27FC236}">
-                <a16:creationId xmlns:a16="http://schemas.microsoft.com/office/drawing/2014/main" id="{E3A1FC88-562A-40A9-9492-C8B124C91B8D}"/>
+                <a16:creationId xmlns:a16="http://schemas.microsoft.com/office/drawing/2014/main" xmlns="" id="{E3A1FC88-562A-40A9-9492-C8B124C91B8D}"/>
               </a:ext>
             </a:extLst>
           </p:cNvPr>
@@ -8870,7 +8870,7 @@
           <p:cNvPr id="3" name="Content Placeholder 2">
             <a:extLst>
               <a:ext uri="{FF2B5EF4-FFF2-40B4-BE49-F238E27FC236}">
-                <a16:creationId xmlns:a16="http://schemas.microsoft.com/office/drawing/2014/main" id="{122162FB-3496-4AFE-88C6-BC2E4F51E496}"/>
+                <a16:creationId xmlns:a16="http://schemas.microsoft.com/office/drawing/2014/main" xmlns="" id="{122162FB-3496-4AFE-88C6-BC2E4F51E496}"/>
               </a:ext>
             </a:extLst>
           </p:cNvPr>
@@ -8889,47 +8889,112 @@
           <a:lstStyle/>
           <a:p>
             <a:r>
-              <a:rPr lang="en-US" sz="2800" dirty="0"/>
-              <a:t>Folder/</a:t>
-            </a:r>
+              <a:rPr lang="en-US" sz="2800" dirty="0" smtClean="0"/>
+              <a:t>CS3249_Assignment3</a:t>
+            </a:r>
+            <a:r>
+              <a:rPr lang="en-US" sz="2800" dirty="0" smtClean="0"/>
+              <a:t>/</a:t>
+            </a:r>
+            <a:endParaRPr lang="en-US" sz="2800" dirty="0"/>
           </a:p>
           <a:p>
             <a:pPr lvl="1"/>
             <a:r>
-              <a:rPr lang="en-US" sz="2400" dirty="0"/>
-              <a:t>Folder2/</a:t>
+              <a:rPr lang="en-US" sz="2400" dirty="0" err="1" smtClean="0"/>
+              <a:t>src</a:t>
+            </a:r>
+            <a:r>
+              <a:rPr lang="en-US" sz="2400" dirty="0" smtClean="0"/>
+              <a:t>/</a:t>
             </a:r>
           </a:p>
           <a:p>
             <a:pPr lvl="2"/>
             <a:r>
+              <a:rPr lang="en-US" sz="2000" dirty="0" err="1" smtClean="0"/>
+              <a:t>App.jsx</a:t>
+            </a:r>
+            <a:endParaRPr lang="en-US" sz="1600" dirty="0" smtClean="0"/>
+          </a:p>
+          <a:p>
+            <a:pPr lvl="2"/>
+            <a:r>
+              <a:rPr lang="en-US" sz="2000" dirty="0" smtClean="0"/>
+              <a:t>thermostatMachine.js</a:t>
+            </a:r>
+          </a:p>
+          <a:p>
+            <a:pPr lvl="3"/>
+            <a:r>
+              <a:rPr lang="en-US" sz="1600" dirty="0" smtClean="0"/>
+              <a:t>State machine using </a:t>
+            </a:r>
+            <a:r>
+              <a:rPr lang="en-US" sz="1600" dirty="0" err="1" smtClean="0"/>
+              <a:t>xState</a:t>
+            </a:r>
+            <a:endParaRPr lang="en-US" sz="1600" dirty="0" smtClean="0"/>
+          </a:p>
+          <a:p>
+            <a:pPr lvl="2"/>
+            <a:r>
               <a:rPr lang="en-US" sz="2000" dirty="0"/>
-              <a:t>…</a:t>
-            </a:r>
-          </a:p>
-          <a:p>
-            <a:pPr lvl="1"/>
-            <a:r>
-              <a:rPr lang="en-US" sz="2400" dirty="0"/>
-              <a:t>File1</a:t>
-            </a:r>
-          </a:p>
-          <a:p>
-            <a:pPr lvl="1"/>
-            <a:r>
-              <a:rPr lang="en-US" sz="2400" dirty="0"/>
-              <a:t>File2</a:t>
-            </a:r>
-          </a:p>
-          <a:p>
-            <a:pPr lvl="1"/>
-            <a:r>
-              <a:rPr lang="en-US" sz="2400" dirty="0"/>
-              <a:t>…</a:t>
-            </a:r>
-          </a:p>
-          <a:p>
-            <a:pPr lvl="1"/>
+              <a:t>v</a:t>
+            </a:r>
+            <a:r>
+              <a:rPr lang="en-US" sz="2000" dirty="0" smtClean="0"/>
+              <a:t>iew</a:t>
+            </a:r>
+          </a:p>
+          <a:p>
+            <a:pPr lvl="3"/>
+            <a:r>
+              <a:rPr lang="en-US" sz="1600" dirty="0" err="1" smtClean="0"/>
+              <a:t>MainPanel.jsx</a:t>
+            </a:r>
+            <a:endParaRPr lang="en-US" sz="1600" dirty="0" smtClean="0"/>
+          </a:p>
+          <a:p>
+            <a:pPr lvl="4"/>
+            <a:r>
+              <a:rPr lang="en-US" sz="1600" dirty="0" smtClean="0"/>
+              <a:t>Holds all View and </a:t>
+            </a:r>
+            <a:r>
+              <a:rPr lang="en-US" sz="1600" dirty="0" err="1" smtClean="0"/>
+              <a:t>ViewModel</a:t>
+            </a:r>
+            <a:r>
+              <a:rPr lang="en-US" sz="1600" dirty="0" smtClean="0"/>
+              <a:t> functions and components</a:t>
+            </a:r>
+            <a:endParaRPr lang="en-US" sz="1600" dirty="0"/>
+          </a:p>
+          <a:p>
+            <a:pPr lvl="2"/>
+            <a:r>
+              <a:rPr lang="en-US" sz="2000" dirty="0"/>
+              <a:t>m</a:t>
+            </a:r>
+            <a:r>
+              <a:rPr lang="en-US" sz="2000" dirty="0" smtClean="0"/>
+              <a:t>odel</a:t>
+            </a:r>
+          </a:p>
+          <a:p>
+            <a:pPr lvl="3"/>
+            <a:r>
+              <a:rPr lang="en-US" sz="1600" dirty="0" smtClean="0"/>
+              <a:t>TemperatureDataModel.js</a:t>
+            </a:r>
+          </a:p>
+          <a:p>
+            <a:pPr lvl="4"/>
+            <a:r>
+              <a:rPr lang="en-US" sz="1600" dirty="0" smtClean="0"/>
+              <a:t>Model for temperature data</a:t>
+            </a:r>
             <a:endParaRPr lang="en-US" sz="2400" dirty="0"/>
           </a:p>
         </p:txBody>
@@ -8939,7 +9004,7 @@
           <p:cNvPr id="4" name="Slide Number Placeholder 3">
             <a:extLst>
               <a:ext uri="{FF2B5EF4-FFF2-40B4-BE49-F238E27FC236}">
-                <a16:creationId xmlns:a16="http://schemas.microsoft.com/office/drawing/2014/main" id="{29705F2A-AC0C-47BB-9F04-A4A23C64DEF3}"/>
+                <a16:creationId xmlns:a16="http://schemas.microsoft.com/office/drawing/2014/main" xmlns="" id="{29705F2A-AC0C-47BB-9F04-A4A23C64DEF3}"/>
               </a:ext>
             </a:extLst>
           </p:cNvPr>
@@ -8969,7 +9034,7 @@
           <p:cNvPr id="5" name="Rectangle 4">
             <a:extLst>
               <a:ext uri="{FF2B5EF4-FFF2-40B4-BE49-F238E27FC236}">
-                <a16:creationId xmlns:a16="http://schemas.microsoft.com/office/drawing/2014/main" id="{29016D4E-97E3-4D07-A902-C6BA10E915C7}"/>
+                <a16:creationId xmlns:a16="http://schemas.microsoft.com/office/drawing/2014/main" xmlns="" id="{29016D4E-97E3-4D07-A902-C6BA10E915C7}"/>
               </a:ext>
             </a:extLst>
           </p:cNvPr>
@@ -9053,7 +9118,7 @@
           <p:cNvPr id="24" name="Picture 23">
             <a:extLst>
               <a:ext uri="{FF2B5EF4-FFF2-40B4-BE49-F238E27FC236}">
-                <a16:creationId xmlns:a16="http://schemas.microsoft.com/office/drawing/2014/main" id="{52F06EA9-F250-4304-8C0A-191AF6B41CB5}"/>
+                <a16:creationId xmlns:a16="http://schemas.microsoft.com/office/drawing/2014/main" xmlns="" id="{52F06EA9-F250-4304-8C0A-191AF6B41CB5}"/>
               </a:ext>
             </a:extLst>
           </p:cNvPr>
@@ -9082,7 +9147,7 @@
           <p:cNvPr id="2" name="Title 1">
             <a:extLst>
               <a:ext uri="{FF2B5EF4-FFF2-40B4-BE49-F238E27FC236}">
-                <a16:creationId xmlns:a16="http://schemas.microsoft.com/office/drawing/2014/main" id="{A418199B-A618-4B2F-AE3A-84D4A631B665}"/>
+                <a16:creationId xmlns:a16="http://schemas.microsoft.com/office/drawing/2014/main" xmlns="" id="{A418199B-A618-4B2F-AE3A-84D4A631B665}"/>
               </a:ext>
             </a:extLst>
           </p:cNvPr>
@@ -9111,7 +9176,7 @@
           <p:cNvPr id="4" name="Slide Number Placeholder 3">
             <a:extLst>
               <a:ext uri="{FF2B5EF4-FFF2-40B4-BE49-F238E27FC236}">
-                <a16:creationId xmlns:a16="http://schemas.microsoft.com/office/drawing/2014/main" id="{2564E604-843C-4952-AC58-724EE6937FFC}"/>
+                <a16:creationId xmlns:a16="http://schemas.microsoft.com/office/drawing/2014/main" xmlns="" id="{2564E604-843C-4952-AC58-724EE6937FFC}"/>
               </a:ext>
             </a:extLst>
           </p:cNvPr>
@@ -9141,7 +9206,7 @@
           <p:cNvPr id="7" name="Oval 6">
             <a:extLst>
               <a:ext uri="{FF2B5EF4-FFF2-40B4-BE49-F238E27FC236}">
-                <a16:creationId xmlns:a16="http://schemas.microsoft.com/office/drawing/2014/main" id="{80BD9522-D467-45FD-A26C-A2A306D53A0D}"/>
+                <a16:creationId xmlns:a16="http://schemas.microsoft.com/office/drawing/2014/main" xmlns="" id="{80BD9522-D467-45FD-A26C-A2A306D53A0D}"/>
               </a:ext>
             </a:extLst>
           </p:cNvPr>
@@ -9193,7 +9258,7 @@
           <p:cNvPr id="12" name="Rectangle 11">
             <a:extLst>
               <a:ext uri="{FF2B5EF4-FFF2-40B4-BE49-F238E27FC236}">
-                <a16:creationId xmlns:a16="http://schemas.microsoft.com/office/drawing/2014/main" id="{7ABA9356-23B3-4122-B4EF-19D72516C898}"/>
+                <a16:creationId xmlns:a16="http://schemas.microsoft.com/office/drawing/2014/main" xmlns="" id="{7ABA9356-23B3-4122-B4EF-19D72516C898}"/>
               </a:ext>
             </a:extLst>
           </p:cNvPr>
@@ -9246,7 +9311,7 @@
           <p:cNvPr id="27" name="Connector: Elbow 26">
             <a:extLst>
               <a:ext uri="{FF2B5EF4-FFF2-40B4-BE49-F238E27FC236}">
-                <a16:creationId xmlns:a16="http://schemas.microsoft.com/office/drawing/2014/main" id="{AD96D0BD-EF06-4425-9FB0-0991354D62CF}"/>
+                <a16:creationId xmlns:a16="http://schemas.microsoft.com/office/drawing/2014/main" xmlns="" id="{AD96D0BD-EF06-4425-9FB0-0991354D62CF}"/>
               </a:ext>
             </a:extLst>
           </p:cNvPr>
@@ -9295,7 +9360,7 @@
           <p:cNvPr id="8" name="Rectangle 7">
             <a:extLst>
               <a:ext uri="{FF2B5EF4-FFF2-40B4-BE49-F238E27FC236}">
-                <a16:creationId xmlns:a16="http://schemas.microsoft.com/office/drawing/2014/main" id="{7ABA9356-23B3-4122-B4EF-19D72516C898}"/>
+                <a16:creationId xmlns:a16="http://schemas.microsoft.com/office/drawing/2014/main" xmlns="" id="{7ABA9356-23B3-4122-B4EF-19D72516C898}"/>
               </a:ext>
             </a:extLst>
           </p:cNvPr>
@@ -9348,7 +9413,7 @@
           <p:cNvPr id="9" name="Rectangle 8">
             <a:extLst>
               <a:ext uri="{FF2B5EF4-FFF2-40B4-BE49-F238E27FC236}">
-                <a16:creationId xmlns:a16="http://schemas.microsoft.com/office/drawing/2014/main" id="{7ABA9356-23B3-4122-B4EF-19D72516C898}"/>
+                <a16:creationId xmlns:a16="http://schemas.microsoft.com/office/drawing/2014/main" xmlns="" id="{7ABA9356-23B3-4122-B4EF-19D72516C898}"/>
               </a:ext>
             </a:extLst>
           </p:cNvPr>
@@ -9401,7 +9466,7 @@
           <p:cNvPr id="10" name="Rectangle 9">
             <a:extLst>
               <a:ext uri="{FF2B5EF4-FFF2-40B4-BE49-F238E27FC236}">
-                <a16:creationId xmlns:a16="http://schemas.microsoft.com/office/drawing/2014/main" id="{7ABA9356-23B3-4122-B4EF-19D72516C898}"/>
+                <a16:creationId xmlns:a16="http://schemas.microsoft.com/office/drawing/2014/main" xmlns="" id="{7ABA9356-23B3-4122-B4EF-19D72516C898}"/>
               </a:ext>
             </a:extLst>
           </p:cNvPr>
@@ -9454,7 +9519,7 @@
           <p:cNvPr id="11" name="Rectangle 10">
             <a:extLst>
               <a:ext uri="{FF2B5EF4-FFF2-40B4-BE49-F238E27FC236}">
-                <a16:creationId xmlns:a16="http://schemas.microsoft.com/office/drawing/2014/main" id="{7ABA9356-23B3-4122-B4EF-19D72516C898}"/>
+                <a16:creationId xmlns:a16="http://schemas.microsoft.com/office/drawing/2014/main" xmlns="" id="{7ABA9356-23B3-4122-B4EF-19D72516C898}"/>
               </a:ext>
             </a:extLst>
           </p:cNvPr>
@@ -9507,7 +9572,7 @@
           <p:cNvPr id="13" name="Rectangle 12">
             <a:extLst>
               <a:ext uri="{FF2B5EF4-FFF2-40B4-BE49-F238E27FC236}">
-                <a16:creationId xmlns:a16="http://schemas.microsoft.com/office/drawing/2014/main" id="{7ABA9356-23B3-4122-B4EF-19D72516C898}"/>
+                <a16:creationId xmlns:a16="http://schemas.microsoft.com/office/drawing/2014/main" xmlns="" id="{7ABA9356-23B3-4122-B4EF-19D72516C898}"/>
               </a:ext>
             </a:extLst>
           </p:cNvPr>
@@ -9560,7 +9625,7 @@
           <p:cNvPr id="14" name="Rectangle 13">
             <a:extLst>
               <a:ext uri="{FF2B5EF4-FFF2-40B4-BE49-F238E27FC236}">
-                <a16:creationId xmlns:a16="http://schemas.microsoft.com/office/drawing/2014/main" id="{7ABA9356-23B3-4122-B4EF-19D72516C898}"/>
+                <a16:creationId xmlns:a16="http://schemas.microsoft.com/office/drawing/2014/main" xmlns="" id="{7ABA9356-23B3-4122-B4EF-19D72516C898}"/>
               </a:ext>
             </a:extLst>
           </p:cNvPr>
@@ -9751,7 +9816,7 @@
           <p:cNvPr id="20" name="Connector: Elbow 26">
             <a:extLst>
               <a:ext uri="{FF2B5EF4-FFF2-40B4-BE49-F238E27FC236}">
-                <a16:creationId xmlns:a16="http://schemas.microsoft.com/office/drawing/2014/main" id="{AD96D0BD-EF06-4425-9FB0-0991354D62CF}"/>
+                <a16:creationId xmlns:a16="http://schemas.microsoft.com/office/drawing/2014/main" xmlns="" id="{AD96D0BD-EF06-4425-9FB0-0991354D62CF}"/>
               </a:ext>
             </a:extLst>
           </p:cNvPr>
@@ -9800,7 +9865,7 @@
           <p:cNvPr id="21" name="Connector: Elbow 26">
             <a:extLst>
               <a:ext uri="{FF2B5EF4-FFF2-40B4-BE49-F238E27FC236}">
-                <a16:creationId xmlns:a16="http://schemas.microsoft.com/office/drawing/2014/main" id="{AD96D0BD-EF06-4425-9FB0-0991354D62CF}"/>
+                <a16:creationId xmlns:a16="http://schemas.microsoft.com/office/drawing/2014/main" xmlns="" id="{AD96D0BD-EF06-4425-9FB0-0991354D62CF}"/>
               </a:ext>
             </a:extLst>
           </p:cNvPr>
@@ -9849,7 +9914,7 @@
           <p:cNvPr id="22" name="Connector: Elbow 26">
             <a:extLst>
               <a:ext uri="{FF2B5EF4-FFF2-40B4-BE49-F238E27FC236}">
-                <a16:creationId xmlns:a16="http://schemas.microsoft.com/office/drawing/2014/main" id="{AD96D0BD-EF06-4425-9FB0-0991354D62CF}"/>
+                <a16:creationId xmlns:a16="http://schemas.microsoft.com/office/drawing/2014/main" xmlns="" id="{AD96D0BD-EF06-4425-9FB0-0991354D62CF}"/>
               </a:ext>
             </a:extLst>
           </p:cNvPr>
@@ -9898,7 +9963,7 @@
           <p:cNvPr id="23" name="Connector: Elbow 26">
             <a:extLst>
               <a:ext uri="{FF2B5EF4-FFF2-40B4-BE49-F238E27FC236}">
-                <a16:creationId xmlns:a16="http://schemas.microsoft.com/office/drawing/2014/main" id="{AD96D0BD-EF06-4425-9FB0-0991354D62CF}"/>
+                <a16:creationId xmlns:a16="http://schemas.microsoft.com/office/drawing/2014/main" xmlns="" id="{AD96D0BD-EF06-4425-9FB0-0991354D62CF}"/>
               </a:ext>
             </a:extLst>
           </p:cNvPr>
@@ -9947,7 +10012,7 @@
           <p:cNvPr id="25" name="Connector: Elbow 26">
             <a:extLst>
               <a:ext uri="{FF2B5EF4-FFF2-40B4-BE49-F238E27FC236}">
-                <a16:creationId xmlns:a16="http://schemas.microsoft.com/office/drawing/2014/main" id="{AD96D0BD-EF06-4425-9FB0-0991354D62CF}"/>
+                <a16:creationId xmlns:a16="http://schemas.microsoft.com/office/drawing/2014/main" xmlns="" id="{AD96D0BD-EF06-4425-9FB0-0991354D62CF}"/>
               </a:ext>
             </a:extLst>
           </p:cNvPr>
@@ -10586,7 +10651,7 @@
           <p:cNvPr id="2" name="Title 1">
             <a:extLst>
               <a:ext uri="{FF2B5EF4-FFF2-40B4-BE49-F238E27FC236}">
-                <a16:creationId xmlns:a16="http://schemas.microsoft.com/office/drawing/2014/main" id="{E276E36C-C80B-4E82-BBA5-1941988AECC3}"/>
+                <a16:creationId xmlns:a16="http://schemas.microsoft.com/office/drawing/2014/main" xmlns="" id="{E276E36C-C80B-4E82-BBA5-1941988AECC3}"/>
               </a:ext>
             </a:extLst>
           </p:cNvPr>
@@ -10617,7 +10682,7 @@
           <p:cNvPr id="4" name="Slide Number Placeholder 3">
             <a:extLst>
               <a:ext uri="{FF2B5EF4-FFF2-40B4-BE49-F238E27FC236}">
-                <a16:creationId xmlns:a16="http://schemas.microsoft.com/office/drawing/2014/main" id="{A446D1E8-CB91-49EC-BF45-D12A124C4FF7}"/>
+                <a16:creationId xmlns:a16="http://schemas.microsoft.com/office/drawing/2014/main" xmlns="" id="{A446D1E8-CB91-49EC-BF45-D12A124C4FF7}"/>
               </a:ext>
             </a:extLst>
           </p:cNvPr>
@@ -10647,7 +10712,7 @@
           <p:cNvPr id="8" name="Content Placeholder 7" descr="A screenshot of a cell phone&#10;&#10;Description automatically generated">
             <a:extLst>
               <a:ext uri="{FF2B5EF4-FFF2-40B4-BE49-F238E27FC236}">
-                <a16:creationId xmlns:a16="http://schemas.microsoft.com/office/drawing/2014/main" id="{6001DBC6-71C1-442E-8A40-D31635602E8A}"/>
+                <a16:creationId xmlns:a16="http://schemas.microsoft.com/office/drawing/2014/main" xmlns="" id="{6001DBC6-71C1-442E-8A40-D31635602E8A}"/>
               </a:ext>
             </a:extLst>
           </p:cNvPr>
@@ -10724,7 +10789,7 @@
           <p:cNvPr id="2" name="Title 1">
             <a:extLst>
               <a:ext uri="{FF2B5EF4-FFF2-40B4-BE49-F238E27FC236}">
-                <a16:creationId xmlns:a16="http://schemas.microsoft.com/office/drawing/2014/main" id="{E276E36C-C80B-4E82-BBA5-1941988AECC3}"/>
+                <a16:creationId xmlns:a16="http://schemas.microsoft.com/office/drawing/2014/main" xmlns="" id="{E276E36C-C80B-4E82-BBA5-1941988AECC3}"/>
               </a:ext>
             </a:extLst>
           </p:cNvPr>
@@ -10738,27 +10803,14 @@
         <p:spPr/>
         <p:txBody>
           <a:bodyPr>
-            <a:normAutofit fontScale="90000"/>
+            <a:normAutofit/>
           </a:bodyPr>
           <a:lstStyle/>
           <a:p>
             <a:pPr algn="l"/>
             <a:r>
-              <a:rPr lang="en-US" dirty="0" err="1"/>
+              <a:rPr lang="en-US" dirty="0" err="1" smtClean="0"/>
               <a:t>Statechart</a:t>
-            </a:r>
-            <a:br>
-              <a:rPr lang="en-US" dirty="0"/>
-            </a:br>
-            <a:r>
-              <a:rPr lang="en-US" sz="2700" dirty="0">
-                <a:hlinkClick r:id="rId2"/>
-              </a:rPr>
-              <a:t>http://draw.io/</a:t>
-            </a:r>
-            <a:r>
-              <a:rPr lang="en-US" sz="2700" dirty="0"/>
-              <a:t>... </a:t>
             </a:r>
             <a:endParaRPr lang="en-US" dirty="0"/>
           </a:p>
@@ -10769,7 +10821,7 @@
           <p:cNvPr id="4" name="Slide Number Placeholder 3">
             <a:extLst>
               <a:ext uri="{FF2B5EF4-FFF2-40B4-BE49-F238E27FC236}">
-                <a16:creationId xmlns:a16="http://schemas.microsoft.com/office/drawing/2014/main" id="{A446D1E8-CB91-49EC-BF45-D12A124C4FF7}"/>
+                <a16:creationId xmlns:a16="http://schemas.microsoft.com/office/drawing/2014/main" xmlns="" id="{A446D1E8-CB91-49EC-BF45-D12A124C4FF7}"/>
               </a:ext>
             </a:extLst>
           </p:cNvPr>
@@ -10796,7 +10848,7 @@
       </p:sp>
       <p:pic>
         <p:nvPicPr>
-          <p:cNvPr id="3" name="Content Placeholder 2"/>
+          <p:cNvPr id="6" name="Content Placeholder 5"/>
           <p:cNvPicPr>
             <a:picLocks noGrp="1" noChangeAspect="1"/>
           </p:cNvPicPr>
@@ -10805,7 +10857,7 @@
           </p:nvPr>
         </p:nvPicPr>
         <p:blipFill>
-          <a:blip r:embed="rId3">
+          <a:blip r:embed="rId2">
             <a:extLst>
               <a:ext uri="{28A0092B-C50C-407E-A947-70E740481C1C}">
                 <a14:useLocalDpi xmlns:a14="http://schemas.microsoft.com/office/drawing/2010/main" val="0"/>
@@ -10818,8 +10870,8 @@
         </p:blipFill>
         <p:spPr>
           <a:xfrm>
-            <a:off x="1873364" y="1600200"/>
-            <a:ext cx="5397271" cy="4525963"/>
+            <a:off x="1600200" y="1363214"/>
+            <a:ext cx="6356236" cy="5330118"/>
           </a:xfrm>
         </p:spPr>
       </p:pic>
@@ -10870,7 +10922,7 @@
           <p:cNvPr id="2" name="Title 1">
             <a:extLst>
               <a:ext uri="{FF2B5EF4-FFF2-40B4-BE49-F238E27FC236}">
-                <a16:creationId xmlns:a16="http://schemas.microsoft.com/office/drawing/2014/main" id="{E3A1FC88-562A-40A9-9492-C8B124C91B8D}"/>
+                <a16:creationId xmlns:a16="http://schemas.microsoft.com/office/drawing/2014/main" xmlns="" id="{E3A1FC88-562A-40A9-9492-C8B124C91B8D}"/>
               </a:ext>
             </a:extLst>
           </p:cNvPr>
@@ -10900,7 +10952,7 @@
           <p:cNvPr id="3" name="Content Placeholder 2">
             <a:extLst>
               <a:ext uri="{FF2B5EF4-FFF2-40B4-BE49-F238E27FC236}">
-                <a16:creationId xmlns:a16="http://schemas.microsoft.com/office/drawing/2014/main" id="{122162FB-3496-4AFE-88C6-BC2E4F51E496}"/>
+                <a16:creationId xmlns:a16="http://schemas.microsoft.com/office/drawing/2014/main" xmlns="" id="{122162FB-3496-4AFE-88C6-BC2E4F51E496}"/>
               </a:ext>
             </a:extLst>
           </p:cNvPr>
@@ -10914,10 +10966,50 @@
         <p:spPr/>
         <p:txBody>
           <a:bodyPr>
-            <a:normAutofit/>
+            <a:normAutofit fontScale="92500"/>
           </a:bodyPr>
           <a:lstStyle/>
           <a:p>
+            <a:r>
+              <a:rPr lang="en-US" dirty="0" err="1" smtClean="0"/>
+              <a:t>updateTextBox</a:t>
+            </a:r>
+            <a:r>
+              <a:rPr lang="en-US" dirty="0" smtClean="0"/>
+              <a:t>() – event handler to update </a:t>
+            </a:r>
+            <a:r>
+              <a:rPr lang="en-US" dirty="0" err="1" smtClean="0"/>
+              <a:t>textBox</a:t>
+            </a:r>
+            <a:r>
+              <a:rPr lang="en-US" dirty="0" smtClean="0"/>
+              <a:t> state to whatever is in the text box on any change</a:t>
+            </a:r>
+          </a:p>
+          <a:p>
+            <a:r>
+              <a:rPr lang="en-US" dirty="0" err="1" smtClean="0"/>
+              <a:t>updateCurrentTemp</a:t>
+            </a:r>
+            <a:r>
+              <a:rPr lang="en-US" dirty="0" smtClean="0"/>
+              <a:t>() – updates current temperature to whatever value between 32 and 100 in the text box as specified in assignment brief. Other values will return warnings.</a:t>
+            </a:r>
+          </a:p>
+          <a:p>
+            <a:r>
+              <a:rPr lang="en-US" dirty="0" smtClean="0"/>
+              <a:t>State chart implemented with </a:t>
+            </a:r>
+            <a:r>
+              <a:rPr lang="en-US" dirty="0" err="1" smtClean="0"/>
+              <a:t>xState</a:t>
+            </a:r>
+            <a:r>
+              <a:rPr lang="en-US" dirty="0" smtClean="0"/>
+              <a:t> with corresponding state changes on events. </a:t>
+            </a:r>
             <a:endParaRPr lang="en-US" dirty="0"/>
           </a:p>
         </p:txBody>
@@ -10927,7 +11019,7 @@
           <p:cNvPr id="4" name="Slide Number Placeholder 3">
             <a:extLst>
               <a:ext uri="{FF2B5EF4-FFF2-40B4-BE49-F238E27FC236}">
-                <a16:creationId xmlns:a16="http://schemas.microsoft.com/office/drawing/2014/main" id="{29705F2A-AC0C-47BB-9F04-A4A23C64DEF3}"/>
+                <a16:creationId xmlns:a16="http://schemas.microsoft.com/office/drawing/2014/main" xmlns="" id="{29705F2A-AC0C-47BB-9F04-A4A23C64DEF3}"/>
               </a:ext>
             </a:extLst>
           </p:cNvPr>
@@ -10999,7 +11091,7 @@
           <p:cNvPr id="2" name="Title 1">
             <a:extLst>
               <a:ext uri="{FF2B5EF4-FFF2-40B4-BE49-F238E27FC236}">
-                <a16:creationId xmlns:a16="http://schemas.microsoft.com/office/drawing/2014/main" id="{AADACEA6-C6E3-4DF4-9C77-44F52BB7AA1A}"/>
+                <a16:creationId xmlns:a16="http://schemas.microsoft.com/office/drawing/2014/main" xmlns="" id="{AADACEA6-C6E3-4DF4-9C77-44F52BB7AA1A}"/>
               </a:ext>
             </a:extLst>
           </p:cNvPr>
@@ -11033,7 +11125,7 @@
           <p:cNvPr id="3" name="Content Placeholder 2">
             <a:extLst>
               <a:ext uri="{FF2B5EF4-FFF2-40B4-BE49-F238E27FC236}">
-                <a16:creationId xmlns:a16="http://schemas.microsoft.com/office/drawing/2014/main" id="{08B0B89C-6A31-43E3-BAD2-BC0EE2E2144F}"/>
+                <a16:creationId xmlns:a16="http://schemas.microsoft.com/office/drawing/2014/main" xmlns="" id="{08B0B89C-6A31-43E3-BAD2-BC0EE2E2144F}"/>
               </a:ext>
             </a:extLst>
           </p:cNvPr>
@@ -11052,11 +11144,108 @@
         </p:spPr>
         <p:txBody>
           <a:bodyPr>
-            <a:normAutofit/>
+            <a:normAutofit fontScale="77500" lnSpcReduction="20000"/>
           </a:bodyPr>
           <a:lstStyle/>
           <a:p>
-            <a:endParaRPr lang="en-US" dirty="0"/>
+            <a:r>
+              <a:rPr lang="en-US" dirty="0" smtClean="0"/>
+              <a:t>Radial slider was achieved with a combination of </a:t>
+            </a:r>
+            <a:r>
+              <a:rPr lang="en-US" dirty="0" err="1" smtClean="0"/>
+              <a:t>mouseDown</a:t>
+            </a:r>
+            <a:r>
+              <a:rPr lang="en-US" dirty="0" smtClean="0"/>
+              <a:t>, </a:t>
+            </a:r>
+            <a:r>
+              <a:rPr lang="en-US" dirty="0" err="1" smtClean="0"/>
+              <a:t>mouseUp</a:t>
+            </a:r>
+            <a:r>
+              <a:rPr lang="en-US" dirty="0" smtClean="0"/>
+              <a:t> and </a:t>
+            </a:r>
+            <a:r>
+              <a:rPr lang="en-US" dirty="0" err="1" smtClean="0"/>
+              <a:t>mouseMove</a:t>
+            </a:r>
+            <a:r>
+              <a:rPr lang="en-US" dirty="0" smtClean="0"/>
+              <a:t> events. </a:t>
+            </a:r>
+            <a:r>
+              <a:rPr lang="en-US" dirty="0" err="1" smtClean="0"/>
+              <a:t>mouseDown</a:t>
+            </a:r>
+            <a:r>
+              <a:rPr lang="en-US" dirty="0" smtClean="0"/>
+              <a:t> and </a:t>
+            </a:r>
+            <a:r>
+              <a:rPr lang="en-US" dirty="0" err="1" smtClean="0"/>
+              <a:t>mouseUp</a:t>
+            </a:r>
+            <a:r>
+              <a:rPr lang="en-US" dirty="0" smtClean="0"/>
+              <a:t> were used to toggle the </a:t>
+            </a:r>
+            <a:r>
+              <a:rPr lang="en-US" dirty="0" err="1" smtClean="0"/>
+              <a:t>mouseDown</a:t>
+            </a:r>
+            <a:r>
+              <a:rPr lang="en-US" dirty="0" smtClean="0"/>
+              <a:t>(clicked) state. </a:t>
+            </a:r>
+            <a:r>
+              <a:rPr lang="en-US" dirty="0" err="1" smtClean="0"/>
+              <a:t>mouseMove</a:t>
+            </a:r>
+            <a:r>
+              <a:rPr lang="en-US" dirty="0" smtClean="0"/>
+              <a:t> would update the radial slider angle and call </a:t>
+            </a:r>
+            <a:r>
+              <a:rPr lang="en-US" dirty="0" err="1" smtClean="0"/>
+              <a:t>coolingMode</a:t>
+            </a:r>
+            <a:r>
+              <a:rPr lang="en-US" dirty="0" smtClean="0"/>
+              <a:t>() to update the thermostat mode accordingly.</a:t>
+            </a:r>
+          </a:p>
+          <a:p>
+            <a:r>
+              <a:rPr lang="en-US" dirty="0" smtClean="0"/>
+              <a:t>Angle between cursor and center of dial was calculated using Math.atan2() and used to position the dial pointer</a:t>
+            </a:r>
+          </a:p>
+          <a:p>
+            <a:r>
+              <a:rPr lang="en-US" dirty="0" err="1" smtClean="0"/>
+              <a:t>CustomEvent</a:t>
+            </a:r>
+            <a:r>
+              <a:rPr lang="en-US" dirty="0" smtClean="0"/>
+              <a:t> dispatched by document on any </a:t>
+            </a:r>
+            <a:r>
+              <a:rPr lang="en-US" dirty="0" err="1" smtClean="0"/>
+              <a:t>mouseUp</a:t>
+            </a:r>
+            <a:r>
+              <a:rPr lang="en-US" dirty="0" smtClean="0"/>
+              <a:t> event, returning current degree value.</a:t>
+            </a:r>
+          </a:p>
+          <a:p>
+            <a:r>
+              <a:rPr lang="en-US" dirty="0" smtClean="0"/>
+              <a:t>Temperatures were restricted to between 50 and 80 by limiting the angle of the slider, as specified in the assignment brief. </a:t>
+            </a:r>
           </a:p>
         </p:txBody>
       </p:sp>
@@ -11065,7 +11254,7 @@
           <p:cNvPr id="4" name="Slide Number Placeholder 3">
             <a:extLst>
               <a:ext uri="{FF2B5EF4-FFF2-40B4-BE49-F238E27FC236}">
-                <a16:creationId xmlns:a16="http://schemas.microsoft.com/office/drawing/2014/main" id="{55F0F331-779C-4EC7-BF29-7392DA7C9A80}"/>
+                <a16:creationId xmlns:a16="http://schemas.microsoft.com/office/drawing/2014/main" xmlns="" id="{55F0F331-779C-4EC7-BF29-7392DA7C9A80}"/>
               </a:ext>
             </a:extLst>
           </p:cNvPr>
@@ -11137,7 +11326,7 @@
           <p:cNvPr id="2" name="Title 1">
             <a:extLst>
               <a:ext uri="{FF2B5EF4-FFF2-40B4-BE49-F238E27FC236}">
-                <a16:creationId xmlns:a16="http://schemas.microsoft.com/office/drawing/2014/main" id="{E3A1FC88-562A-40A9-9492-C8B124C91B8D}"/>
+                <a16:creationId xmlns:a16="http://schemas.microsoft.com/office/drawing/2014/main" xmlns="" id="{E3A1FC88-562A-40A9-9492-C8B124C91B8D}"/>
               </a:ext>
             </a:extLst>
           </p:cNvPr>
@@ -11175,7 +11364,7 @@
           <p:cNvPr id="3" name="Content Placeholder 2">
             <a:extLst>
               <a:ext uri="{FF2B5EF4-FFF2-40B4-BE49-F238E27FC236}">
-                <a16:creationId xmlns:a16="http://schemas.microsoft.com/office/drawing/2014/main" id="{122162FB-3496-4AFE-88C6-BC2E4F51E496}"/>
+                <a16:creationId xmlns:a16="http://schemas.microsoft.com/office/drawing/2014/main" xmlns="" id="{122162FB-3496-4AFE-88C6-BC2E4F51E496}"/>
               </a:ext>
             </a:extLst>
           </p:cNvPr>
@@ -11193,6 +11382,32 @@
           </a:bodyPr>
           <a:lstStyle/>
           <a:p>
+            <a:r>
+              <a:rPr lang="en-US" dirty="0" smtClean="0"/>
+              <a:t>Controlling with the mouse wheel scroll was implemented with the native </a:t>
+            </a:r>
+            <a:r>
+              <a:rPr lang="en-US" dirty="0" err="1" smtClean="0"/>
+              <a:t>Javascript</a:t>
+            </a:r>
+            <a:r>
+              <a:rPr lang="en-US" dirty="0" smtClean="0"/>
+              <a:t> wheel event handler on the same DOM of the radial slider.</a:t>
+            </a:r>
+          </a:p>
+          <a:p>
+            <a:r>
+              <a:rPr lang="en-US" dirty="0" smtClean="0"/>
+              <a:t>Pointer position was updated via state by adding numerical value of wheel scroll (using native </a:t>
+            </a:r>
+            <a:r>
+              <a:rPr lang="en-US" dirty="0" err="1" smtClean="0"/>
+              <a:t>deltaY</a:t>
+            </a:r>
+            <a:r>
+              <a:rPr lang="en-US" dirty="0" smtClean="0"/>
+              <a:t> component of scroll event) to the current degree angle.</a:t>
+            </a:r>
             <a:endParaRPr lang="en-US" dirty="0"/>
           </a:p>
         </p:txBody>
@@ -11202,7 +11417,7 @@
           <p:cNvPr id="4" name="Slide Number Placeholder 3">
             <a:extLst>
               <a:ext uri="{FF2B5EF4-FFF2-40B4-BE49-F238E27FC236}">
-                <a16:creationId xmlns:a16="http://schemas.microsoft.com/office/drawing/2014/main" id="{29705F2A-AC0C-47BB-9F04-A4A23C64DEF3}"/>
+                <a16:creationId xmlns:a16="http://schemas.microsoft.com/office/drawing/2014/main" xmlns="" id="{29705F2A-AC0C-47BB-9F04-A4A23C64DEF3}"/>
               </a:ext>
             </a:extLst>
           </p:cNvPr>
@@ -11274,7 +11489,7 @@
           <p:cNvPr id="2" name="Title 1">
             <a:extLst>
               <a:ext uri="{FF2B5EF4-FFF2-40B4-BE49-F238E27FC236}">
-                <a16:creationId xmlns:a16="http://schemas.microsoft.com/office/drawing/2014/main" id="{E3A1FC88-562A-40A9-9492-C8B124C91B8D}"/>
+                <a16:creationId xmlns:a16="http://schemas.microsoft.com/office/drawing/2014/main" xmlns="" id="{E3A1FC88-562A-40A9-9492-C8B124C91B8D}"/>
               </a:ext>
             </a:extLst>
           </p:cNvPr>
@@ -11311,7 +11526,7 @@
           <p:cNvPr id="3" name="Content Placeholder 2">
             <a:extLst>
               <a:ext uri="{FF2B5EF4-FFF2-40B4-BE49-F238E27FC236}">
-                <a16:creationId xmlns:a16="http://schemas.microsoft.com/office/drawing/2014/main" id="{122162FB-3496-4AFE-88C6-BC2E4F51E496}"/>
+                <a16:creationId xmlns:a16="http://schemas.microsoft.com/office/drawing/2014/main" xmlns="" id="{122162FB-3496-4AFE-88C6-BC2E4F51E496}"/>
               </a:ext>
             </a:extLst>
           </p:cNvPr>
@@ -11329,6 +11544,16 @@
           </a:bodyPr>
           <a:lstStyle/>
           <a:p>
+            <a:r>
+              <a:rPr lang="en-US" dirty="0" smtClean="0"/>
+              <a:t>The VVM components were all included in one JSX file for ease of sharing of cooling mode and temperature states across both the text and circle rendering functions. </a:t>
+            </a:r>
+          </a:p>
+          <a:p>
+            <a:r>
+              <a:rPr lang="en-US" dirty="0" smtClean="0"/>
+              <a:t>Heavy use of component states was essential in keeping track of various parameters and modes, such as cooling mode, current angle, current state, text box content etc. </a:t>
+            </a:r>
             <a:endParaRPr lang="en-US" dirty="0"/>
           </a:p>
         </p:txBody>
@@ -11338,7 +11563,7 @@
           <p:cNvPr id="4" name="Slide Number Placeholder 3">
             <a:extLst>
               <a:ext uri="{FF2B5EF4-FFF2-40B4-BE49-F238E27FC236}">
-                <a16:creationId xmlns:a16="http://schemas.microsoft.com/office/drawing/2014/main" id="{29705F2A-AC0C-47BB-9F04-A4A23C64DEF3}"/>
+                <a16:creationId xmlns:a16="http://schemas.microsoft.com/office/drawing/2014/main" xmlns="" id="{29705F2A-AC0C-47BB-9F04-A4A23C64DEF3}"/>
               </a:ext>
             </a:extLst>
           </p:cNvPr>
@@ -11410,7 +11635,7 @@
           <p:cNvPr id="2" name="Title 1">
             <a:extLst>
               <a:ext uri="{FF2B5EF4-FFF2-40B4-BE49-F238E27FC236}">
-                <a16:creationId xmlns:a16="http://schemas.microsoft.com/office/drawing/2014/main" id="{E3A1FC88-562A-40A9-9492-C8B124C91B8D}"/>
+                <a16:creationId xmlns:a16="http://schemas.microsoft.com/office/drawing/2014/main" xmlns="" id="{E3A1FC88-562A-40A9-9492-C8B124C91B8D}"/>
               </a:ext>
             </a:extLst>
           </p:cNvPr>
@@ -11447,7 +11672,7 @@
           <p:cNvPr id="3" name="Content Placeholder 2">
             <a:extLst>
               <a:ext uri="{FF2B5EF4-FFF2-40B4-BE49-F238E27FC236}">
-                <a16:creationId xmlns:a16="http://schemas.microsoft.com/office/drawing/2014/main" id="{122162FB-3496-4AFE-88C6-BC2E4F51E496}"/>
+                <a16:creationId xmlns:a16="http://schemas.microsoft.com/office/drawing/2014/main" xmlns="" id="{122162FB-3496-4AFE-88C6-BC2E4F51E496}"/>
               </a:ext>
             </a:extLst>
           </p:cNvPr>
@@ -11465,7 +11690,17 @@
           </a:bodyPr>
           <a:lstStyle/>
           <a:p>
-            <a:endParaRPr lang="en-US" dirty="0"/>
+            <a:r>
+              <a:rPr lang="en-US" dirty="0" smtClean="0"/>
+              <a:t>Use of SVG for the dial was chosen due to native rotate function for SVG objects. This made simulating the rotation visually simpler.</a:t>
+            </a:r>
+          </a:p>
+          <a:p>
+            <a:r>
+              <a:rPr lang="en-US" dirty="0" smtClean="0"/>
+              <a:t>Using a ‘transform’ component state to hold a string value of “rotate(x)” where x is the current degree of rotation made it easier to update the SVG transform element dynamically. </a:t>
+            </a:r>
+            <a:endParaRPr lang="en-US" dirty="0" smtClean="0"/>
           </a:p>
         </p:txBody>
       </p:sp>
@@ -11474,7 +11709,7 @@
           <p:cNvPr id="4" name="Slide Number Placeholder 3">
             <a:extLst>
               <a:ext uri="{FF2B5EF4-FFF2-40B4-BE49-F238E27FC236}">
-                <a16:creationId xmlns:a16="http://schemas.microsoft.com/office/drawing/2014/main" id="{29705F2A-AC0C-47BB-9F04-A4A23C64DEF3}"/>
+                <a16:creationId xmlns:a16="http://schemas.microsoft.com/office/drawing/2014/main" xmlns="" id="{29705F2A-AC0C-47BB-9F04-A4A23C64DEF3}"/>
               </a:ext>
             </a:extLst>
           </p:cNvPr>

</xml_diff>